<commit_message>
Adding slides for links, references, minor updates
</commit_message>
<xml_diff>
--- a/Introduction to shiny.pptx
+++ b/Introduction to shiny.pptx
@@ -13,7 +13,9 @@
     <p:sldId id="267" r:id="rId7"/>
     <p:sldId id="268" r:id="rId8"/>
     <p:sldId id="270" r:id="rId9"/>
-    <p:sldId id="269" r:id="rId10"/>
+    <p:sldId id="272" r:id="rId10"/>
+    <p:sldId id="269" r:id="rId11"/>
+    <p:sldId id="271" r:id="rId12"/>
   </p:sldIdLst>
   <p:sldSz cx="12192000" cy="6858000"/>
   <p:notesSz cx="6858000" cy="9144000"/>
@@ -11975,7 +11977,7 @@
           <a:p>
             <a:fld id="{6AD6EE87-EBD5-4F12-A48A-63ACA297AC8F}" type="datetimeFigureOut">
               <a:rPr lang="en-US" dirty="0"/>
-              <a:t>8/5/2020</a:t>
+              <a:t>2/20/2021</a:t>
             </a:fld>
             <a:endParaRPr lang="en-US" dirty="0"/>
           </a:p>
@@ -12177,7 +12179,7 @@
           <a:p>
             <a:fld id="{4CD73815-2707-4475-8F1A-B873CB631BB4}" type="datetimeFigureOut">
               <a:rPr lang="en-US" dirty="0"/>
-              <a:t>8/5/2020</a:t>
+              <a:t>2/20/2021</a:t>
             </a:fld>
             <a:endParaRPr lang="en-US" dirty="0"/>
           </a:p>
@@ -12352,7 +12354,7 @@
           <a:p>
             <a:fld id="{2A4AFB99-0EAB-4182-AFF8-E214C82A68F6}" type="datetimeFigureOut">
               <a:rPr lang="en-US" dirty="0"/>
-              <a:t>8/5/2020</a:t>
+              <a:t>2/20/2021</a:t>
             </a:fld>
             <a:endParaRPr lang="en-US" dirty="0"/>
           </a:p>
@@ -12552,7 +12554,7 @@
           <a:p>
             <a:fld id="{A5D3794B-289A-4A80-97D7-111025398D45}" type="datetimeFigureOut">
               <a:rPr lang="en-US" dirty="0"/>
-              <a:t>8/5/2020</a:t>
+              <a:t>2/20/2021</a:t>
             </a:fld>
             <a:endParaRPr lang="en-US" dirty="0"/>
           </a:p>
@@ -21445,7 +21447,7 @@
           <a:p>
             <a:fld id="{5A61015F-7CC6-4D0A-9D87-873EA4C304CC}" type="datetimeFigureOut">
               <a:rPr lang="en-US" dirty="0"/>
-              <a:t>8/5/2020</a:t>
+              <a:t>2/20/2021</a:t>
             </a:fld>
             <a:endParaRPr lang="en-US" dirty="0"/>
           </a:p>
@@ -21714,7 +21716,7 @@
           <a:p>
             <a:fld id="{93C6A301-0538-44EC-B09D-202E1042A48B}" type="datetimeFigureOut">
               <a:rPr lang="en-US" dirty="0"/>
-              <a:t>8/5/2020</a:t>
+              <a:t>2/20/2021</a:t>
             </a:fld>
             <a:endParaRPr lang="en-US" dirty="0"/>
           </a:p>
@@ -22107,7 +22109,7 @@
           <a:p>
             <a:fld id="{D789574A-8875-45EF-8EA2-3CAA0F7ABC4C}" type="datetimeFigureOut">
               <a:rPr lang="en-US" dirty="0"/>
-              <a:t>8/5/2020</a:t>
+              <a:t>2/20/2021</a:t>
             </a:fld>
             <a:endParaRPr lang="en-US" dirty="0"/>
           </a:p>
@@ -22220,7 +22222,7 @@
           <a:p>
             <a:fld id="{67EF4D4C-5367-4C26-9E2B-D8088D7FCA81}" type="datetimeFigureOut">
               <a:rPr lang="en-US" dirty="0"/>
-              <a:t>8/5/2020</a:t>
+              <a:t>2/20/2021</a:t>
             </a:fld>
             <a:endParaRPr lang="en-US" dirty="0"/>
           </a:p>
@@ -22310,7 +22312,7 @@
           <a:p>
             <a:fld id="{56E91E96-98B0-4413-9547-46F3504108EF}" type="datetimeFigureOut">
               <a:rPr lang="en-US" dirty="0"/>
-              <a:t>8/5/2020</a:t>
+              <a:t>2/20/2021</a:t>
             </a:fld>
             <a:endParaRPr lang="en-US" dirty="0"/>
           </a:p>
@@ -22595,7 +22597,7 @@
           <a:p>
             <a:fld id="{05C68B11-C5A8-448C-8CE9-B1A273C79CFC}" type="datetimeFigureOut">
               <a:rPr lang="en-US" dirty="0"/>
-              <a:t>8/5/2020</a:t>
+              <a:t>2/20/2021</a:t>
             </a:fld>
             <a:endParaRPr lang="en-US" dirty="0"/>
           </a:p>
@@ -22870,7 +22872,7 @@
           <a:p>
             <a:fld id="{C7616CA0-919D-4A49-9C8A-62FDFB3A5183}" type="datetimeFigureOut">
               <a:rPr lang="en-US" dirty="0"/>
-              <a:t>8/5/2020</a:t>
+              <a:t>2/20/2021</a:t>
             </a:fld>
             <a:endParaRPr lang="en-US" dirty="0"/>
           </a:p>
@@ -23116,7 +23118,7 @@
             <a:fld id="{90298CD5-6C1E-4009-B41F-6DF62E31D3BE}" type="datetimeFigureOut">
               <a:rPr lang="en-US" dirty="0"/>
               <a:pPr/>
-              <a:t>8/5/2020</a:t>
+              <a:t>2/20/2021</a:t>
             </a:fld>
             <a:endParaRPr lang="en-US" dirty="0"/>
           </a:p>
@@ -23662,6 +23664,565 @@
     <p:extLst>
       <p:ext uri="{BB962C8B-B14F-4D97-AF65-F5344CB8AC3E}">
         <p14:creationId xmlns:p14="http://schemas.microsoft.com/office/powerpoint/2010/main" val="2067396764"/>
+      </p:ext>
+    </p:extLst>
+  </p:cSld>
+  <p:clrMapOvr>
+    <a:masterClrMapping/>
+  </p:clrMapOvr>
+</p:sld>
+</file>
+
+<file path=ppt/slides/slide10.xml><?xml version="1.0" encoding="utf-8"?>
+<p:sld xmlns:a="http://schemas.openxmlformats.org/drawingml/2006/main" xmlns:r="http://schemas.openxmlformats.org/officeDocument/2006/relationships" xmlns:p="http://schemas.openxmlformats.org/presentationml/2006/main">
+  <p:cSld>
+    <p:spTree>
+      <p:nvGrpSpPr>
+        <p:cNvPr id="1" name=""/>
+        <p:cNvGrpSpPr/>
+        <p:nvPr/>
+      </p:nvGrpSpPr>
+      <p:grpSpPr>
+        <a:xfrm>
+          <a:off x="0" y="0"/>
+          <a:ext cx="0" cy="0"/>
+          <a:chOff x="0" y="0"/>
+          <a:chExt cx="0" cy="0"/>
+        </a:xfrm>
+      </p:grpSpPr>
+      <p:sp>
+        <p:nvSpPr>
+          <p:cNvPr id="2" name="Title 1"/>
+          <p:cNvSpPr>
+            <a:spLocks noGrp="1"/>
+          </p:cNvSpPr>
+          <p:nvPr>
+            <p:ph type="title"/>
+          </p:nvPr>
+        </p:nvSpPr>
+        <p:spPr/>
+        <p:txBody>
+          <a:bodyPr/>
+          <a:lstStyle/>
+          <a:p>
+            <a:r>
+              <a:rPr lang="en-US" dirty="0"/>
+              <a:t>Ideas we will need for making anything of practical use…</a:t>
+            </a:r>
+          </a:p>
+        </p:txBody>
+      </p:sp>
+      <p:sp>
+        <p:nvSpPr>
+          <p:cNvPr id="3" name="Content Placeholder 2"/>
+          <p:cNvSpPr>
+            <a:spLocks noGrp="1"/>
+          </p:cNvSpPr>
+          <p:nvPr>
+            <p:ph idx="1"/>
+          </p:nvPr>
+        </p:nvSpPr>
+        <p:spPr>
+          <a:xfrm>
+            <a:off x="1024127" y="1953202"/>
+            <a:ext cx="9720073" cy="4023360"/>
+          </a:xfrm>
+        </p:spPr>
+        <p:txBody>
+          <a:bodyPr/>
+          <a:lstStyle/>
+          <a:p>
+            <a:pPr marL="0" indent="0">
+              <a:buNone/>
+            </a:pPr>
+            <a:endParaRPr lang="en-US" dirty="0"/>
+          </a:p>
+        </p:txBody>
+      </p:sp>
+      <p:sp>
+        <p:nvSpPr>
+          <p:cNvPr id="4" name="Rounded Rectangle 3"/>
+          <p:cNvSpPr/>
+          <p:nvPr/>
+        </p:nvSpPr>
+        <p:spPr>
+          <a:xfrm>
+            <a:off x="1965627" y="2314327"/>
+            <a:ext cx="7366716" cy="1433425"/>
+          </a:xfrm>
+          <a:prstGeom prst="roundRect">
+            <a:avLst/>
+          </a:prstGeom>
+        </p:spPr>
+        <p:style>
+          <a:lnRef idx="2">
+            <a:schemeClr val="accent1">
+              <a:shade val="50000"/>
+            </a:schemeClr>
+          </a:lnRef>
+          <a:fillRef idx="1">
+            <a:schemeClr val="accent1"/>
+          </a:fillRef>
+          <a:effectRef idx="0">
+            <a:schemeClr val="accent1"/>
+          </a:effectRef>
+          <a:fontRef idx="minor">
+            <a:schemeClr val="lt1"/>
+          </a:fontRef>
+        </p:style>
+        <p:txBody>
+          <a:bodyPr rtlCol="0" anchor="ctr"/>
+          <a:lstStyle/>
+          <a:p>
+            <a:pPr algn="ctr"/>
+            <a:r>
+              <a:rPr lang="en-US" dirty="0"/>
+              <a:t>Reactive expressions, Observable events</a:t>
+            </a:r>
+          </a:p>
+          <a:p>
+            <a:pPr algn="ctr"/>
+            <a:r>
+              <a:rPr lang="en-US" dirty="0"/>
+              <a:t>(see this link https://shiny.rstudio.com/tutorial/written-tutorial/lesson6/)</a:t>
+            </a:r>
+          </a:p>
+        </p:txBody>
+      </p:sp>
+      <p:sp>
+        <p:nvSpPr>
+          <p:cNvPr id="5" name="Rounded Rectangle 4"/>
+          <p:cNvSpPr/>
+          <p:nvPr/>
+        </p:nvSpPr>
+        <p:spPr>
+          <a:xfrm>
+            <a:off x="1965627" y="4179617"/>
+            <a:ext cx="7366716" cy="1433425"/>
+          </a:xfrm>
+          <a:prstGeom prst="roundRect">
+            <a:avLst/>
+          </a:prstGeom>
+        </p:spPr>
+        <p:style>
+          <a:lnRef idx="2">
+            <a:schemeClr val="accent1">
+              <a:shade val="50000"/>
+            </a:schemeClr>
+          </a:lnRef>
+          <a:fillRef idx="1">
+            <a:schemeClr val="accent1"/>
+          </a:fillRef>
+          <a:effectRef idx="0">
+            <a:schemeClr val="accent1"/>
+          </a:effectRef>
+          <a:fontRef idx="minor">
+            <a:schemeClr val="lt1"/>
+          </a:fontRef>
+        </p:style>
+        <p:txBody>
+          <a:bodyPr rtlCol="0" anchor="ctr"/>
+          <a:lstStyle/>
+          <a:p>
+            <a:pPr algn="ctr"/>
+            <a:r>
+              <a:rPr lang="en-US" dirty="0" err="1"/>
+              <a:t>OutputProxy</a:t>
+            </a:r>
+            <a:r>
+              <a:rPr lang="en-US" dirty="0"/>
+              <a:t> </a:t>
+            </a:r>
+          </a:p>
+          <a:p>
+            <a:pPr algn="ctr"/>
+            <a:r>
+              <a:rPr lang="en-US" dirty="0"/>
+              <a:t>(see </a:t>
+            </a:r>
+            <a:r>
+              <a:rPr lang="en-US" dirty="0">
+                <a:hlinkClick r:id="rId2"/>
+              </a:rPr>
+              <a:t>https://www.rdocumentation.org/packages/leaflet/versions/2.0.2/topics/leafletProxy</a:t>
+            </a:r>
+            <a:r>
+              <a:rPr lang="en-US" dirty="0"/>
+              <a:t> and </a:t>
+            </a:r>
+            <a:r>
+              <a:rPr lang="en-US" dirty="0">
+                <a:hlinkClick r:id="rId3"/>
+              </a:rPr>
+              <a:t>https://plot.ly/r/plotlyproxy/</a:t>
+            </a:r>
+            <a:r>
+              <a:rPr lang="en-US" dirty="0"/>
+              <a:t> for examples)</a:t>
+            </a:r>
+          </a:p>
+        </p:txBody>
+      </p:sp>
+    </p:spTree>
+    <p:extLst>
+      <p:ext uri="{BB962C8B-B14F-4D97-AF65-F5344CB8AC3E}">
+        <p14:creationId xmlns:p14="http://schemas.microsoft.com/office/powerpoint/2010/main" val="1724829551"/>
+      </p:ext>
+    </p:extLst>
+  </p:cSld>
+  <p:clrMapOvr>
+    <a:masterClrMapping/>
+  </p:clrMapOvr>
+</p:sld>
+</file>
+
+<file path=ppt/slides/slide11.xml><?xml version="1.0" encoding="utf-8"?>
+<p:sld xmlns:a="http://schemas.openxmlformats.org/drawingml/2006/main" xmlns:r="http://schemas.openxmlformats.org/officeDocument/2006/relationships" xmlns:p="http://schemas.openxmlformats.org/presentationml/2006/main">
+  <p:cSld>
+    <p:spTree>
+      <p:nvGrpSpPr>
+        <p:cNvPr id="1" name=""/>
+        <p:cNvGrpSpPr/>
+        <p:nvPr/>
+      </p:nvGrpSpPr>
+      <p:grpSpPr>
+        <a:xfrm>
+          <a:off x="0" y="0"/>
+          <a:ext cx="0" cy="0"/>
+          <a:chOff x="0" y="0"/>
+          <a:chExt cx="0" cy="0"/>
+        </a:xfrm>
+      </p:grpSpPr>
+      <p:sp>
+        <p:nvSpPr>
+          <p:cNvPr id="2" name="Title 1">
+            <a:extLst>
+              <a:ext uri="{FF2B5EF4-FFF2-40B4-BE49-F238E27FC236}">
+                <a16:creationId xmlns:a16="http://schemas.microsoft.com/office/drawing/2014/main" id="{F17D1C99-DD43-46EA-B453-401522614847}"/>
+              </a:ext>
+            </a:extLst>
+          </p:cNvPr>
+          <p:cNvSpPr>
+            <a:spLocks noGrp="1"/>
+          </p:cNvSpPr>
+          <p:nvPr>
+            <p:ph type="title"/>
+          </p:nvPr>
+        </p:nvSpPr>
+        <p:spPr/>
+        <p:txBody>
+          <a:bodyPr/>
+          <a:lstStyle/>
+          <a:p>
+            <a:r>
+              <a:rPr lang="en-US" dirty="0"/>
+              <a:t>Additional Resources</a:t>
+            </a:r>
+          </a:p>
+        </p:txBody>
+      </p:sp>
+      <p:sp>
+        <p:nvSpPr>
+          <p:cNvPr id="3" name="Content Placeholder 2">
+            <a:extLst>
+              <a:ext uri="{FF2B5EF4-FFF2-40B4-BE49-F238E27FC236}">
+                <a16:creationId xmlns:a16="http://schemas.microsoft.com/office/drawing/2014/main" id="{6EB7BD77-1750-4224-8224-9538DDDE5FBA}"/>
+              </a:ext>
+            </a:extLst>
+          </p:cNvPr>
+          <p:cNvSpPr>
+            <a:spLocks noGrp="1"/>
+          </p:cNvSpPr>
+          <p:nvPr>
+            <p:ph idx="1"/>
+          </p:nvPr>
+        </p:nvSpPr>
+        <p:spPr/>
+        <p:txBody>
+          <a:bodyPr/>
+          <a:lstStyle/>
+          <a:p>
+            <a:endParaRPr lang="en-US" dirty="0"/>
+          </a:p>
+        </p:txBody>
+      </p:sp>
+      <p:graphicFrame>
+        <p:nvGraphicFramePr>
+          <p:cNvPr id="4" name="Table 4">
+            <a:extLst>
+              <a:ext uri="{FF2B5EF4-FFF2-40B4-BE49-F238E27FC236}">
+                <a16:creationId xmlns:a16="http://schemas.microsoft.com/office/drawing/2014/main" id="{36DAAF08-B616-4981-A3A6-15C84BF17E17}"/>
+              </a:ext>
+            </a:extLst>
+          </p:cNvPr>
+          <p:cNvGraphicFramePr>
+            <a:graphicFrameLocks noGrp="1"/>
+          </p:cNvGraphicFramePr>
+          <p:nvPr>
+            <p:extLst>
+              <p:ext uri="{D42A27DB-BD31-4B8C-83A1-F6EECF244321}">
+                <p14:modId xmlns:p14="http://schemas.microsoft.com/office/powerpoint/2010/main" val="1289200092"/>
+              </p:ext>
+            </p:extLst>
+          </p:nvPr>
+        </p:nvGraphicFramePr>
+        <p:xfrm>
+          <a:off x="1024126" y="2286000"/>
+          <a:ext cx="10445823" cy="4271250"/>
+        </p:xfrm>
+        <a:graphic>
+          <a:graphicData uri="http://schemas.openxmlformats.org/drawingml/2006/table">
+            <a:tbl>
+              <a:tblPr firstRow="1" bandRow="1">
+                <a:tableStyleId>{5C22544A-7EE6-4342-B048-85BDC9FD1C3A}</a:tableStyleId>
+              </a:tblPr>
+              <a:tblGrid>
+                <a:gridCol w="3481941">
+                  <a:extLst>
+                    <a:ext uri="{9D8B030D-6E8A-4147-A177-3AD203B41FA5}">
+                      <a16:colId xmlns:a16="http://schemas.microsoft.com/office/drawing/2014/main" val="1722150710"/>
+                    </a:ext>
+                  </a:extLst>
+                </a:gridCol>
+                <a:gridCol w="3650936">
+                  <a:extLst>
+                    <a:ext uri="{9D8B030D-6E8A-4147-A177-3AD203B41FA5}">
+                      <a16:colId xmlns:a16="http://schemas.microsoft.com/office/drawing/2014/main" val="2569811400"/>
+                    </a:ext>
+                  </a:extLst>
+                </a:gridCol>
+                <a:gridCol w="3312946">
+                  <a:extLst>
+                    <a:ext uri="{9D8B030D-6E8A-4147-A177-3AD203B41FA5}">
+                      <a16:colId xmlns:a16="http://schemas.microsoft.com/office/drawing/2014/main" val="2128555796"/>
+                    </a:ext>
+                  </a:extLst>
+                </a:gridCol>
+              </a:tblGrid>
+              <a:tr h="305306">
+                <a:tc>
+                  <a:txBody>
+                    <a:bodyPr/>
+                    <a:lstStyle/>
+                    <a:p>
+                      <a:r>
+                        <a:rPr lang="en-US" dirty="0"/>
+                        <a:t>Title</a:t>
+                      </a:r>
+                    </a:p>
+                  </a:txBody>
+                  <a:tcPr/>
+                </a:tc>
+                <a:tc>
+                  <a:txBody>
+                    <a:bodyPr/>
+                    <a:lstStyle/>
+                    <a:p>
+                      <a:r>
+                        <a:rPr lang="en-US" dirty="0"/>
+                        <a:t>Link</a:t>
+                      </a:r>
+                    </a:p>
+                  </a:txBody>
+                  <a:tcPr/>
+                </a:tc>
+                <a:tc>
+                  <a:txBody>
+                    <a:bodyPr/>
+                    <a:lstStyle/>
+                    <a:p>
+                      <a:r>
+                        <a:rPr lang="en-US" dirty="0"/>
+                        <a:t>Notes</a:t>
+                      </a:r>
+                    </a:p>
+                  </a:txBody>
+                  <a:tcPr/>
+                </a:tc>
+                <a:extLst>
+                  <a:ext uri="{0D108BD9-81ED-4DB2-BD59-A6C34878D82A}">
+                    <a16:rowId xmlns:a16="http://schemas.microsoft.com/office/drawing/2014/main" val="3486384741"/>
+                  </a:ext>
+                </a:extLst>
+              </a:tr>
+              <a:tr h="306708">
+                <a:tc>
+                  <a:txBody>
+                    <a:bodyPr/>
+                    <a:lstStyle/>
+                    <a:p>
+                      <a:r>
+                        <a:rPr lang="en-US" dirty="0"/>
+                        <a:t>Shiny in production</a:t>
+                      </a:r>
+                    </a:p>
+                  </a:txBody>
+                  <a:tcPr/>
+                </a:tc>
+                <a:tc>
+                  <a:txBody>
+                    <a:bodyPr/>
+                    <a:lstStyle/>
+                    <a:p>
+                      <a:r>
+                        <a:rPr lang="en-US" dirty="0"/>
+                        <a:t>https://engineering-shiny.org</a:t>
+                      </a:r>
+                    </a:p>
+                  </a:txBody>
+                  <a:tcPr/>
+                </a:tc>
+                <a:tc>
+                  <a:txBody>
+                    <a:bodyPr/>
+                    <a:lstStyle/>
+                    <a:p>
+                      <a:r>
+                        <a:rPr lang="en-US" dirty="0"/>
+                        <a:t>Online book. Also see video from </a:t>
+                      </a:r>
+                      <a:r>
+                        <a:rPr lang="en-US" dirty="0" err="1"/>
+                        <a:t>Rstudio</a:t>
+                      </a:r>
+                      <a:r>
+                        <a:rPr lang="en-US" dirty="0"/>
+                        <a:t>::conf 2020.</a:t>
+                      </a:r>
+                    </a:p>
+                    <a:p>
+                      <a:r>
+                        <a:rPr lang="en-US" dirty="0"/>
+                        <a:t>Not an entry level but must read if you intend to build enterprise grade Shiny apps.</a:t>
+                      </a:r>
+                    </a:p>
+                  </a:txBody>
+                  <a:tcPr/>
+                </a:tc>
+                <a:extLst>
+                  <a:ext uri="{0D108BD9-81ED-4DB2-BD59-A6C34878D82A}">
+                    <a16:rowId xmlns:a16="http://schemas.microsoft.com/office/drawing/2014/main" val="1965202367"/>
+                  </a:ext>
+                </a:extLst>
+              </a:tr>
+              <a:tr h="1221225">
+                <a:tc>
+                  <a:txBody>
+                    <a:bodyPr/>
+                    <a:lstStyle/>
+                    <a:p>
+                      <a:r>
+                        <a:rPr lang="en-US" dirty="0"/>
+                        <a:t>Awesome Shiny Extensions</a:t>
+                      </a:r>
+                    </a:p>
+                  </a:txBody>
+                  <a:tcPr/>
+                </a:tc>
+                <a:tc>
+                  <a:txBody>
+                    <a:bodyPr/>
+                    <a:lstStyle/>
+                    <a:p>
+                      <a:r>
+                        <a:rPr lang="en-US" dirty="0"/>
+                        <a:t>https://github.com/nanxstats/awesome-shiny-extensions</a:t>
+                      </a:r>
+                    </a:p>
+                  </a:txBody>
+                  <a:tcPr/>
+                </a:tc>
+                <a:tc>
+                  <a:txBody>
+                    <a:bodyPr/>
+                    <a:lstStyle/>
+                    <a:p>
+                      <a:r>
+                        <a:rPr lang="en-US" dirty="0"/>
+                        <a:t>Tones of cool resources on Shiny (how to build, deploy, test, UI, backend etc.). </a:t>
+                      </a:r>
+                    </a:p>
+                    <a:p>
+                      <a:r>
+                        <a:rPr lang="en-US" dirty="0"/>
+                        <a:t>Not updated for 2 years though.</a:t>
+                      </a:r>
+                    </a:p>
+                  </a:txBody>
+                  <a:tcPr/>
+                </a:tc>
+                <a:extLst>
+                  <a:ext uri="{0D108BD9-81ED-4DB2-BD59-A6C34878D82A}">
+                    <a16:rowId xmlns:a16="http://schemas.microsoft.com/office/drawing/2014/main" val="248706846"/>
+                  </a:ext>
+                </a:extLst>
+              </a:tr>
+              <a:tr h="1221225">
+                <a:tc>
+                  <a:txBody>
+                    <a:bodyPr/>
+                    <a:lstStyle/>
+                    <a:p>
+                      <a:r>
+                        <a:rPr lang="en-US" dirty="0"/>
+                        <a:t>Shiny Gallery</a:t>
+                      </a:r>
+                    </a:p>
+                  </a:txBody>
+                  <a:tcPr/>
+                </a:tc>
+                <a:tc>
+                  <a:txBody>
+                    <a:bodyPr/>
+                    <a:lstStyle/>
+                    <a:p>
+                      <a:r>
+                        <a:rPr lang="en-US" dirty="0">
+                          <a:hlinkClick r:id="rId2"/>
+                        </a:rPr>
+                        <a:t>https://shiny.rstudio.com/gallery/</a:t>
+                      </a:r>
+                      <a:endParaRPr lang="en-US" dirty="0"/>
+                    </a:p>
+                    <a:p>
+                      <a:endParaRPr lang="en-US" dirty="0"/>
+                    </a:p>
+                    <a:p>
+                      <a:r>
+                        <a:rPr lang="en-US" dirty="0"/>
+                        <a:t>https://blog.rstudio.com/2020/07/13/winners-of-the-2nd-shiny-contest/</a:t>
+                      </a:r>
+                    </a:p>
+                  </a:txBody>
+                  <a:tcPr/>
+                </a:tc>
+                <a:tc>
+                  <a:txBody>
+                    <a:bodyPr/>
+                    <a:lstStyle/>
+                    <a:p>
+                      <a:r>
+                        <a:rPr lang="en-US" dirty="0"/>
+                        <a:t>If you are looking for examples of what is possible with Shiny, look no further!</a:t>
+                      </a:r>
+                    </a:p>
+                  </a:txBody>
+                  <a:tcPr/>
+                </a:tc>
+                <a:extLst>
+                  <a:ext uri="{0D108BD9-81ED-4DB2-BD59-A6C34878D82A}">
+                    <a16:rowId xmlns:a16="http://schemas.microsoft.com/office/drawing/2014/main" val="3091215845"/>
+                  </a:ext>
+                </a:extLst>
+              </a:tr>
+            </a:tbl>
+          </a:graphicData>
+        </a:graphic>
+      </p:graphicFrame>
+    </p:spTree>
+    <p:extLst>
+      <p:ext uri="{BB962C8B-B14F-4D97-AF65-F5344CB8AC3E}">
+        <p14:creationId xmlns:p14="http://schemas.microsoft.com/office/powerpoint/2010/main" val="956862330"/>
       </p:ext>
     </p:extLst>
   </p:cSld>
@@ -25329,7 +25890,7 @@
           <p:nvPr>
             <p:extLst>
               <p:ext uri="{D42A27DB-BD31-4B8C-83A1-F6EECF244321}">
-                <p14:modId xmlns:p14="http://schemas.microsoft.com/office/powerpoint/2010/main" val="2514353226"/>
+                <p14:modId xmlns:p14="http://schemas.microsoft.com/office/powerpoint/2010/main" val="2210743700"/>
               </p:ext>
             </p:extLst>
           </p:nvPr>
@@ -25601,7 +26162,21 @@
                     <a:p>
                       <a:r>
                         <a:rPr lang="en-US" dirty="0"/>
-                        <a:t>Data Table (DT)</a:t>
+                        <a:t>Data Table (DT),</a:t>
+                      </a:r>
+                    </a:p>
+                    <a:p>
+                      <a:r>
+                        <a:rPr lang="en-US" dirty="0"/>
+                        <a:t>Also look at “</a:t>
+                      </a:r>
+                      <a:r>
+                        <a:rPr lang="en-US" dirty="0" err="1"/>
+                        <a:t>gt</a:t>
+                      </a:r>
+                      <a:r>
+                        <a:rPr lang="en-US" dirty="0"/>
+                        <a:t>”</a:t>
                       </a:r>
                     </a:p>
                   </a:txBody>
@@ -25696,14 +26271,6 @@
                       <a:r>
                         <a:rPr lang="en-US" dirty="0" err="1"/>
                         <a:t>Dygraphs</a:t>
-                      </a:r>
-                      <a:r>
-                        <a:rPr lang="en-US" dirty="0"/>
-                        <a:t>,</a:t>
-                      </a:r>
-                      <a:r>
-                        <a:rPr lang="en-US" baseline="0" dirty="0"/>
-                        <a:t> sunburst</a:t>
                       </a:r>
                       <a:endParaRPr lang="en-US" dirty="0"/>
                     </a:p>
@@ -25844,7 +26411,7 @@
           <a:p>
             <a:r>
               <a:rPr lang="en-US" dirty="0"/>
-              <a:t>Ideas we will need for making anything of practical use…</a:t>
+              <a:t>A list of recipes I use all the time</a:t>
             </a:r>
           </a:p>
         </p:txBody>
@@ -25876,134 +26443,306 @@
           </a:p>
         </p:txBody>
       </p:sp>
-      <p:sp>
-        <p:nvSpPr>
-          <p:cNvPr id="4" name="Rounded Rectangle 3"/>
-          <p:cNvSpPr/>
-          <p:nvPr/>
-        </p:nvSpPr>
-        <p:spPr>
-          <a:xfrm>
-            <a:off x="1965627" y="2314327"/>
-            <a:ext cx="7366716" cy="1433425"/>
-          </a:xfrm>
-          <a:prstGeom prst="roundRect">
-            <a:avLst/>
-          </a:prstGeom>
-        </p:spPr>
-        <p:style>
-          <a:lnRef idx="2">
-            <a:schemeClr val="accent1">
-              <a:shade val="50000"/>
-            </a:schemeClr>
-          </a:lnRef>
-          <a:fillRef idx="1">
-            <a:schemeClr val="accent1"/>
-          </a:fillRef>
-          <a:effectRef idx="0">
-            <a:schemeClr val="accent1"/>
-          </a:effectRef>
-          <a:fontRef idx="minor">
-            <a:schemeClr val="lt1"/>
-          </a:fontRef>
-        </p:style>
-        <p:txBody>
-          <a:bodyPr rtlCol="0" anchor="ctr"/>
-          <a:lstStyle/>
-          <a:p>
-            <a:pPr algn="ctr"/>
-            <a:r>
-              <a:rPr lang="en-US" dirty="0"/>
-              <a:t>Reactive expressions, Observable events</a:t>
-            </a:r>
-          </a:p>
-          <a:p>
-            <a:pPr algn="ctr"/>
-            <a:r>
-              <a:rPr lang="en-US" dirty="0"/>
-              <a:t>(see this link https://shiny.rstudio.com/tutorial/written-tutorial/lesson6/)</a:t>
-            </a:r>
-          </a:p>
-        </p:txBody>
-      </p:sp>
-      <p:sp>
-        <p:nvSpPr>
-          <p:cNvPr id="5" name="Rounded Rectangle 4"/>
-          <p:cNvSpPr/>
-          <p:nvPr/>
-        </p:nvSpPr>
-        <p:spPr>
-          <a:xfrm>
-            <a:off x="1965627" y="4179617"/>
-            <a:ext cx="7366716" cy="1433425"/>
-          </a:xfrm>
-          <a:prstGeom prst="roundRect">
-            <a:avLst/>
-          </a:prstGeom>
-        </p:spPr>
-        <p:style>
-          <a:lnRef idx="2">
-            <a:schemeClr val="accent1">
-              <a:shade val="50000"/>
-            </a:schemeClr>
-          </a:lnRef>
-          <a:fillRef idx="1">
-            <a:schemeClr val="accent1"/>
-          </a:fillRef>
-          <a:effectRef idx="0">
-            <a:schemeClr val="accent1"/>
-          </a:effectRef>
-          <a:fontRef idx="minor">
-            <a:schemeClr val="lt1"/>
-          </a:fontRef>
-        </p:style>
-        <p:txBody>
-          <a:bodyPr rtlCol="0" anchor="ctr"/>
-          <a:lstStyle/>
-          <a:p>
-            <a:pPr algn="ctr"/>
-            <a:r>
-              <a:rPr lang="en-US" dirty="0" err="1"/>
-              <a:t>OutputProxy</a:t>
-            </a:r>
-            <a:r>
-              <a:rPr lang="en-US" dirty="0"/>
-              <a:t> </a:t>
-            </a:r>
-          </a:p>
-          <a:p>
-            <a:pPr algn="ctr"/>
-            <a:r>
-              <a:rPr lang="en-US" dirty="0"/>
-              <a:t>(see </a:t>
-            </a:r>
-            <a:r>
-              <a:rPr lang="en-US" dirty="0">
-                <a:hlinkClick r:id="rId2"/>
-              </a:rPr>
-              <a:t>https://www.rdocumentation.org/packages/leaflet/versions/2.0.2/topics/leafletProxy</a:t>
-            </a:r>
-            <a:r>
-              <a:rPr lang="en-US" dirty="0"/>
-              <a:t> and </a:t>
-            </a:r>
-            <a:r>
-              <a:rPr lang="en-US" dirty="0">
-                <a:hlinkClick r:id="rId3"/>
-              </a:rPr>
-              <a:t>https://plot.ly/r/plotlyproxy/</a:t>
-            </a:r>
-            <a:r>
-              <a:rPr lang="en-US" dirty="0"/>
-              <a:t> for examples)</a:t>
-            </a:r>
-          </a:p>
-        </p:txBody>
-      </p:sp>
+      <p:graphicFrame>
+        <p:nvGraphicFramePr>
+          <p:cNvPr id="6" name="Table 5"/>
+          <p:cNvGraphicFramePr>
+            <a:graphicFrameLocks noGrp="1"/>
+          </p:cNvGraphicFramePr>
+          <p:nvPr>
+            <p:extLst>
+              <p:ext uri="{D42A27DB-BD31-4B8C-83A1-F6EECF244321}">
+                <p14:modId xmlns:p14="http://schemas.microsoft.com/office/powerpoint/2010/main" val="3656727925"/>
+              </p:ext>
+            </p:extLst>
+          </p:nvPr>
+        </p:nvGraphicFramePr>
+        <p:xfrm>
+          <a:off x="1024126" y="1953202"/>
+          <a:ext cx="10241637" cy="4851400"/>
+        </p:xfrm>
+        <a:graphic>
+          <a:graphicData uri="http://schemas.openxmlformats.org/drawingml/2006/table">
+            <a:tbl>
+              <a:tblPr firstRow="1" bandRow="1">
+                <a:tableStyleId>{5C22544A-7EE6-4342-B048-85BDC9FD1C3A}</a:tableStyleId>
+              </a:tblPr>
+              <a:tblGrid>
+                <a:gridCol w="3413879">
+                  <a:extLst>
+                    <a:ext uri="{9D8B030D-6E8A-4147-A177-3AD203B41FA5}">
+                      <a16:colId xmlns:a16="http://schemas.microsoft.com/office/drawing/2014/main" val="20000"/>
+                    </a:ext>
+                  </a:extLst>
+                </a:gridCol>
+                <a:gridCol w="3413879">
+                  <a:extLst>
+                    <a:ext uri="{9D8B030D-6E8A-4147-A177-3AD203B41FA5}">
+                      <a16:colId xmlns:a16="http://schemas.microsoft.com/office/drawing/2014/main" val="20001"/>
+                    </a:ext>
+                  </a:extLst>
+                </a:gridCol>
+                <a:gridCol w="3413879">
+                  <a:extLst>
+                    <a:ext uri="{9D8B030D-6E8A-4147-A177-3AD203B41FA5}">
+                      <a16:colId xmlns:a16="http://schemas.microsoft.com/office/drawing/2014/main" val="20002"/>
+                    </a:ext>
+                  </a:extLst>
+                </a:gridCol>
+              </a:tblGrid>
+              <a:tr h="370840">
+                <a:tc>
+                  <a:txBody>
+                    <a:bodyPr/>
+                    <a:lstStyle/>
+                    <a:p>
+                      <a:r>
+                        <a:rPr lang="en-US" dirty="0"/>
+                        <a:t>Task</a:t>
+                      </a:r>
+                    </a:p>
+                  </a:txBody>
+                  <a:tcPr/>
+                </a:tc>
+                <a:tc>
+                  <a:txBody>
+                    <a:bodyPr/>
+                    <a:lstStyle/>
+                    <a:p>
+                      <a:r>
+                        <a:rPr lang="en-US" dirty="0"/>
+                        <a:t>Why is it typically needed?</a:t>
+                      </a:r>
+                    </a:p>
+                  </a:txBody>
+                  <a:tcPr/>
+                </a:tc>
+                <a:tc>
+                  <a:txBody>
+                    <a:bodyPr/>
+                    <a:lstStyle/>
+                    <a:p>
+                      <a:r>
+                        <a:rPr lang="en-US" dirty="0"/>
+                        <a:t>Functions</a:t>
+                      </a:r>
+                    </a:p>
+                  </a:txBody>
+                  <a:tcPr/>
+                </a:tc>
+                <a:extLst>
+                  <a:ext uri="{0D108BD9-81ED-4DB2-BD59-A6C34878D82A}">
+                    <a16:rowId xmlns:a16="http://schemas.microsoft.com/office/drawing/2014/main" val="10000"/>
+                  </a:ext>
+                </a:extLst>
+              </a:tr>
+              <a:tr h="370840">
+                <a:tc>
+                  <a:txBody>
+                    <a:bodyPr/>
+                    <a:lstStyle/>
+                    <a:p>
+                      <a:r>
+                        <a:rPr lang="en-US" dirty="0"/>
+                        <a:t>How to upload a file in your Shiny app</a:t>
+                      </a:r>
+                    </a:p>
+                  </a:txBody>
+                  <a:tcPr/>
+                </a:tc>
+                <a:tc>
+                  <a:txBody>
+                    <a:bodyPr/>
+                    <a:lstStyle/>
+                    <a:p>
+                      <a:r>
+                        <a:rPr lang="en-US" dirty="0"/>
+                        <a:t>Allow user to input data in bulk and then provide it to a model or render it on the UI</a:t>
+                      </a:r>
+                    </a:p>
+                  </a:txBody>
+                  <a:tcPr/>
+                </a:tc>
+                <a:tc>
+                  <a:txBody>
+                    <a:bodyPr/>
+                    <a:lstStyle/>
+                    <a:p>
+                      <a:r>
+                        <a:rPr lang="en-US" dirty="0"/>
+                        <a:t>https://shiny.rstudio.com/articles/upload.html</a:t>
+                      </a:r>
+                    </a:p>
+                  </a:txBody>
+                  <a:tcPr/>
+                </a:tc>
+                <a:extLst>
+                  <a:ext uri="{0D108BD9-81ED-4DB2-BD59-A6C34878D82A}">
+                    <a16:rowId xmlns:a16="http://schemas.microsoft.com/office/drawing/2014/main" val="10001"/>
+                  </a:ext>
+                </a:extLst>
+              </a:tr>
+              <a:tr h="370840">
+                <a:tc>
+                  <a:txBody>
+                    <a:bodyPr/>
+                    <a:lstStyle/>
+                    <a:p>
+                      <a:r>
+                        <a:rPr lang="en-US" dirty="0"/>
+                        <a:t>How to download a file</a:t>
+                      </a:r>
+                    </a:p>
+                  </a:txBody>
+                  <a:tcPr/>
+                </a:tc>
+                <a:tc>
+                  <a:txBody>
+                    <a:bodyPr/>
+                    <a:lstStyle/>
+                    <a:p>
+                      <a:r>
+                        <a:rPr lang="en-US" dirty="0"/>
+                        <a:t>Once the model runs and provides data or other backend processing is done or the user simply wants to download data being shown on the UI.</a:t>
+                      </a:r>
+                    </a:p>
+                  </a:txBody>
+                  <a:tcPr/>
+                </a:tc>
+                <a:tc>
+                  <a:txBody>
+                    <a:bodyPr/>
+                    <a:lstStyle/>
+                    <a:p>
+                      <a:r>
+                        <a:rPr lang="en-US" dirty="0"/>
+                        <a:t>https://shiny.rstudio.com/articles/download.html</a:t>
+                      </a:r>
+                    </a:p>
+                  </a:txBody>
+                  <a:tcPr/>
+                </a:tc>
+                <a:extLst>
+                  <a:ext uri="{0D108BD9-81ED-4DB2-BD59-A6C34878D82A}">
+                    <a16:rowId xmlns:a16="http://schemas.microsoft.com/office/drawing/2014/main" val="10002"/>
+                  </a:ext>
+                </a:extLst>
+              </a:tr>
+              <a:tr h="370840">
+                <a:tc>
+                  <a:txBody>
+                    <a:bodyPr/>
+                    <a:lstStyle/>
+                    <a:p>
+                      <a:r>
+                        <a:rPr lang="en-US" dirty="0"/>
+                        <a:t>How to get a progress bar(s) in your Shiny app</a:t>
+                      </a:r>
+                    </a:p>
+                  </a:txBody>
+                  <a:tcPr/>
+                </a:tc>
+                <a:tc>
+                  <a:txBody>
+                    <a:bodyPr/>
+                    <a:lstStyle/>
+                    <a:p>
+                      <a:r>
+                        <a:rPr lang="en-US" dirty="0"/>
+                        <a:t>When the app is processing data or waiting for output from the model, need a progress bar to indicate something is happening.</a:t>
+                      </a:r>
+                    </a:p>
+                  </a:txBody>
+                  <a:tcPr/>
+                </a:tc>
+                <a:tc>
+                  <a:txBody>
+                    <a:bodyPr/>
+                    <a:lstStyle/>
+                    <a:p>
+                      <a:r>
+                        <a:rPr lang="en-US" dirty="0">
+                          <a:hlinkClick r:id="rId2"/>
+                        </a:rPr>
+                        <a:t>https://shiny.rstudio.com/articles/progress.html</a:t>
+                      </a:r>
+                      <a:endParaRPr lang="en-US" dirty="0"/>
+                    </a:p>
+                    <a:p>
+                      <a:r>
+                        <a:rPr lang="en-US" dirty="0"/>
+                        <a:t>https://shiny.rstudio.com/gallery/progress-bar-example.html</a:t>
+                      </a:r>
+                    </a:p>
+                  </a:txBody>
+                  <a:tcPr/>
+                </a:tc>
+                <a:extLst>
+                  <a:ext uri="{0D108BD9-81ED-4DB2-BD59-A6C34878D82A}">
+                    <a16:rowId xmlns:a16="http://schemas.microsoft.com/office/drawing/2014/main" val="10003"/>
+                  </a:ext>
+                </a:extLst>
+              </a:tr>
+              <a:tr h="370840">
+                <a:tc>
+                  <a:txBody>
+                    <a:bodyPr/>
+                    <a:lstStyle/>
+                    <a:p>
+                      <a:r>
+                        <a:rPr lang="en-US" dirty="0"/>
+                        <a:t>Maps in a Shiny App</a:t>
+                      </a:r>
+                    </a:p>
+                  </a:txBody>
+                  <a:tcPr/>
+                </a:tc>
+                <a:tc>
+                  <a:txBody>
+                    <a:bodyPr/>
+                    <a:lstStyle/>
+                    <a:p>
+                      <a:r>
+                        <a:rPr lang="en-US" dirty="0"/>
+                        <a:t>Use maps all the time for everything</a:t>
+                      </a:r>
+                    </a:p>
+                  </a:txBody>
+                  <a:tcPr/>
+                </a:tc>
+                <a:tc>
+                  <a:txBody>
+                    <a:bodyPr/>
+                    <a:lstStyle/>
+                    <a:p>
+                      <a:r>
+                        <a:rPr lang="en-US" dirty="0"/>
+                        <a:t>Leaflet for R</a:t>
+                      </a:r>
+                    </a:p>
+                    <a:p>
+                      <a:r>
+                        <a:rPr lang="en-US" dirty="0"/>
+                        <a:t>https://rstudio.github.io/leaflet/shiny.html</a:t>
+                      </a:r>
+                    </a:p>
+                  </a:txBody>
+                  <a:tcPr/>
+                </a:tc>
+                <a:extLst>
+                  <a:ext uri="{0D108BD9-81ED-4DB2-BD59-A6C34878D82A}">
+                    <a16:rowId xmlns:a16="http://schemas.microsoft.com/office/drawing/2014/main" val="3078005893"/>
+                  </a:ext>
+                </a:extLst>
+              </a:tr>
+            </a:tbl>
+          </a:graphicData>
+        </a:graphic>
+      </p:graphicFrame>
     </p:spTree>
     <p:extLst>
       <p:ext uri="{BB962C8B-B14F-4D97-AF65-F5344CB8AC3E}">
-        <p14:creationId xmlns:p14="http://schemas.microsoft.com/office/powerpoint/2010/main" val="1724829551"/>
+        <p14:creationId xmlns:p14="http://schemas.microsoft.com/office/powerpoint/2010/main" val="3343067084"/>
       </p:ext>
     </p:extLst>
   </p:cSld>

</xml_diff>

<commit_message>
Add golem links to the presentation
</commit_message>
<xml_diff>
--- a/Introduction to shiny.pptx
+++ b/Introduction to shiny.pptx
@@ -11977,7 +11977,7 @@
           <a:p>
             <a:fld id="{6AD6EE87-EBD5-4F12-A48A-63ACA297AC8F}" type="datetimeFigureOut">
               <a:rPr lang="en-US" dirty="0"/>
-              <a:t>2/20/2021</a:t>
+              <a:t>2/24/2021</a:t>
             </a:fld>
             <a:endParaRPr lang="en-US" dirty="0"/>
           </a:p>
@@ -12179,7 +12179,7 @@
           <a:p>
             <a:fld id="{4CD73815-2707-4475-8F1A-B873CB631BB4}" type="datetimeFigureOut">
               <a:rPr lang="en-US" dirty="0"/>
-              <a:t>2/20/2021</a:t>
+              <a:t>2/24/2021</a:t>
             </a:fld>
             <a:endParaRPr lang="en-US" dirty="0"/>
           </a:p>
@@ -12354,7 +12354,7 @@
           <a:p>
             <a:fld id="{2A4AFB99-0EAB-4182-AFF8-E214C82A68F6}" type="datetimeFigureOut">
               <a:rPr lang="en-US" dirty="0"/>
-              <a:t>2/20/2021</a:t>
+              <a:t>2/24/2021</a:t>
             </a:fld>
             <a:endParaRPr lang="en-US" dirty="0"/>
           </a:p>
@@ -12554,7 +12554,7 @@
           <a:p>
             <a:fld id="{A5D3794B-289A-4A80-97D7-111025398D45}" type="datetimeFigureOut">
               <a:rPr lang="en-US" dirty="0"/>
-              <a:t>2/20/2021</a:t>
+              <a:t>2/24/2021</a:t>
             </a:fld>
             <a:endParaRPr lang="en-US" dirty="0"/>
           </a:p>
@@ -21447,7 +21447,7 @@
           <a:p>
             <a:fld id="{5A61015F-7CC6-4D0A-9D87-873EA4C304CC}" type="datetimeFigureOut">
               <a:rPr lang="en-US" dirty="0"/>
-              <a:t>2/20/2021</a:t>
+              <a:t>2/24/2021</a:t>
             </a:fld>
             <a:endParaRPr lang="en-US" dirty="0"/>
           </a:p>
@@ -21716,7 +21716,7 @@
           <a:p>
             <a:fld id="{93C6A301-0538-44EC-B09D-202E1042A48B}" type="datetimeFigureOut">
               <a:rPr lang="en-US" dirty="0"/>
-              <a:t>2/20/2021</a:t>
+              <a:t>2/24/2021</a:t>
             </a:fld>
             <a:endParaRPr lang="en-US" dirty="0"/>
           </a:p>
@@ -22109,7 +22109,7 @@
           <a:p>
             <a:fld id="{D789574A-8875-45EF-8EA2-3CAA0F7ABC4C}" type="datetimeFigureOut">
               <a:rPr lang="en-US" dirty="0"/>
-              <a:t>2/20/2021</a:t>
+              <a:t>2/24/2021</a:t>
             </a:fld>
             <a:endParaRPr lang="en-US" dirty="0"/>
           </a:p>
@@ -22222,7 +22222,7 @@
           <a:p>
             <a:fld id="{67EF4D4C-5367-4C26-9E2B-D8088D7FCA81}" type="datetimeFigureOut">
               <a:rPr lang="en-US" dirty="0"/>
-              <a:t>2/20/2021</a:t>
+              <a:t>2/24/2021</a:t>
             </a:fld>
             <a:endParaRPr lang="en-US" dirty="0"/>
           </a:p>
@@ -22312,7 +22312,7 @@
           <a:p>
             <a:fld id="{56E91E96-98B0-4413-9547-46F3504108EF}" type="datetimeFigureOut">
               <a:rPr lang="en-US" dirty="0"/>
-              <a:t>2/20/2021</a:t>
+              <a:t>2/24/2021</a:t>
             </a:fld>
             <a:endParaRPr lang="en-US" dirty="0"/>
           </a:p>
@@ -22597,7 +22597,7 @@
           <a:p>
             <a:fld id="{05C68B11-C5A8-448C-8CE9-B1A273C79CFC}" type="datetimeFigureOut">
               <a:rPr lang="en-US" dirty="0"/>
-              <a:t>2/20/2021</a:t>
+              <a:t>2/24/2021</a:t>
             </a:fld>
             <a:endParaRPr lang="en-US" dirty="0"/>
           </a:p>
@@ -22872,7 +22872,7 @@
           <a:p>
             <a:fld id="{C7616CA0-919D-4A49-9C8A-62FDFB3A5183}" type="datetimeFigureOut">
               <a:rPr lang="en-US" dirty="0"/>
-              <a:t>2/20/2021</a:t>
+              <a:t>2/24/2021</a:t>
             </a:fld>
             <a:endParaRPr lang="en-US" dirty="0"/>
           </a:p>
@@ -23118,7 +23118,7 @@
             <a:fld id="{90298CD5-6C1E-4009-B41F-6DF62E31D3BE}" type="datetimeFigureOut">
               <a:rPr lang="en-US" dirty="0"/>
               <a:pPr/>
-              <a:t>2/20/2021</a:t>
+              <a:t>2/24/2021</a:t>
             </a:fld>
             <a:endParaRPr lang="en-US" dirty="0"/>
           </a:p>
@@ -23961,14 +23961,14 @@
           <p:nvPr>
             <p:extLst>
               <p:ext uri="{D42A27DB-BD31-4B8C-83A1-F6EECF244321}">
-                <p14:modId xmlns:p14="http://schemas.microsoft.com/office/powerpoint/2010/main" val="1289200092"/>
+                <p14:modId xmlns:p14="http://schemas.microsoft.com/office/powerpoint/2010/main" val="1526938971"/>
               </p:ext>
             </p:extLst>
           </p:nvPr>
         </p:nvGraphicFramePr>
         <p:xfrm>
-          <a:off x="1024126" y="2286000"/>
-          <a:ext cx="10445823" cy="4271250"/>
+          <a:off x="1024128" y="1711071"/>
+          <a:ext cx="10454699" cy="5001158"/>
         </p:xfrm>
         <a:graphic>
           <a:graphicData uri="http://schemas.openxmlformats.org/drawingml/2006/table">
@@ -23977,21 +23977,21 @@
                 <a:tableStyleId>{5C22544A-7EE6-4342-B048-85BDC9FD1C3A}</a:tableStyleId>
               </a:tblPr>
               <a:tblGrid>
-                <a:gridCol w="3481941">
+                <a:gridCol w="2544695">
                   <a:extLst>
                     <a:ext uri="{9D8B030D-6E8A-4147-A177-3AD203B41FA5}">
                       <a16:colId xmlns:a16="http://schemas.microsoft.com/office/drawing/2014/main" val="1722150710"/>
                     </a:ext>
                   </a:extLst>
                 </a:gridCol>
-                <a:gridCol w="3650936">
+                <a:gridCol w="4953740">
                   <a:extLst>
                     <a:ext uri="{9D8B030D-6E8A-4147-A177-3AD203B41FA5}">
                       <a16:colId xmlns:a16="http://schemas.microsoft.com/office/drawing/2014/main" val="2569811400"/>
                     </a:ext>
                   </a:extLst>
                 </a:gridCol>
-                <a:gridCol w="3312946">
+                <a:gridCol w="2956264">
                   <a:extLst>
                     <a:ext uri="{9D8B030D-6E8A-4147-A177-3AD203B41FA5}">
                       <a16:colId xmlns:a16="http://schemas.microsoft.com/office/drawing/2014/main" val="2128555796"/>
@@ -23999,7 +23999,7 @@
                   </a:extLst>
                 </a:gridCol>
               </a:tblGrid>
-              <a:tr h="305306">
+              <a:tr h="347626">
                 <a:tc>
                   <a:txBody>
                     <a:bodyPr/>
@@ -24045,7 +24045,7 @@
                   </a:ext>
                 </a:extLst>
               </a:tr>
-              <a:tr h="306708">
+              <a:tr h="2172662">
                 <a:tc>
                   <a:txBody>
                     <a:bodyPr/>
@@ -24053,7 +24053,50 @@
                     <a:p>
                       <a:r>
                         <a:rPr lang="en-US" dirty="0"/>
-                        <a:t>Shiny in production</a:t>
+                        <a:t>Shiny in production (golem package)</a:t>
+                      </a:r>
+                    </a:p>
+                  </a:txBody>
+                  <a:tcPr/>
+                </a:tc>
+                <a:tc>
+                  <a:txBody>
+                    <a:bodyPr/>
+                    <a:lstStyle/>
+                    <a:p>
+                      <a:r>
+                        <a:rPr lang="en-US" dirty="0">
+                          <a:hlinkClick r:id="rId2"/>
+                        </a:rPr>
+                        <a:t>https://engineering-shiny.org</a:t>
+                      </a:r>
+                      <a:endParaRPr lang="en-US" dirty="0"/>
+                    </a:p>
+                    <a:p>
+                      <a:endParaRPr lang="en-US" dirty="0"/>
+                    </a:p>
+                    <a:p>
+                      <a:r>
+                        <a:rPr lang="en-US" dirty="0">
+                          <a:hlinkClick r:id="rId3"/>
+                        </a:rPr>
+                        <a:t>https://www.barcelonar.org/presentations/BarcelonaR_Building_Production_Grade_Shiny_Apps_with_golem.pdf</a:t>
+                      </a:r>
+                      <a:endParaRPr lang="en-US" dirty="0"/>
+                    </a:p>
+                    <a:p>
+                      <a:endParaRPr lang="en-US" dirty="0"/>
+                    </a:p>
+                    <a:p>
+                      <a:r>
+                        <a:rPr lang="en-US" dirty="0">
+                          <a:hlinkClick r:id="rId4"/>
+                        </a:rPr>
+                        <a:t>https://www.youtube.com/watch?v=YljErMnQqm0&amp;feature=youtu.be</a:t>
+                      </a:r>
+                      <a:r>
+                        <a:rPr lang="en-US" dirty="0"/>
+                        <a:t> (EARL 2020 conference)</a:t>
                       </a:r>
                     </a:p>
                   </a:txBody>
@@ -24066,34 +24109,16 @@
                     <a:p>
                       <a:r>
                         <a:rPr lang="en-US" dirty="0"/>
-                        <a:t>https://engineering-shiny.org</a:t>
+                        <a:t>Online book. </a:t>
                       </a:r>
                     </a:p>
-                  </a:txBody>
-                  <a:tcPr/>
-                </a:tc>
-                <a:tc>
-                  <a:txBody>
-                    <a:bodyPr/>
-                    <a:lstStyle/>
                     <a:p>
-                      <a:r>
-                        <a:rPr lang="en-US" dirty="0"/>
-                        <a:t>Online book. Also see video from </a:t>
-                      </a:r>
-                      <a:r>
-                        <a:rPr lang="en-US" dirty="0" err="1"/>
-                        <a:t>Rstudio</a:t>
-                      </a:r>
-                      <a:r>
-                        <a:rPr lang="en-US" dirty="0"/>
-                        <a:t>::conf 2020.</a:t>
-                      </a:r>
+                      <a:endParaRPr lang="en-US" dirty="0"/>
                     </a:p>
                     <a:p>
                       <a:r>
                         <a:rPr lang="en-US" dirty="0"/>
-                        <a:t>Not an entry level but must read if you intend to build enterprise grade Shiny apps.</a:t>
+                        <a:t>Not an entry level book but must read if you intend to build enterprise grade Shiny apps.</a:t>
                       </a:r>
                     </a:p>
                   </a:txBody>
@@ -24105,7 +24130,7 @@
                   </a:ext>
                 </a:extLst>
               </a:tr>
-              <a:tr h="1221225">
+              <a:tr h="1159080">
                 <a:tc>
                   <a:txBody>
                     <a:bodyPr/>
@@ -24139,7 +24164,7 @@
                     <a:p>
                       <a:r>
                         <a:rPr lang="en-US" dirty="0"/>
-                        <a:t>Tones of cool resources on Shiny (how to build, deploy, test, UI, backend etc.). </a:t>
+                        <a:t>How to build, deploy, test, UI, backend etc.). </a:t>
                       </a:r>
                     </a:p>
                     <a:p>
@@ -24157,7 +24182,7 @@
                   </a:ext>
                 </a:extLst>
               </a:tr>
-              <a:tr h="1221225">
+              <a:tr h="1160678">
                 <a:tc>
                   <a:txBody>
                     <a:bodyPr/>
@@ -24178,13 +24203,10 @@
                     <a:p>
                       <a:r>
                         <a:rPr lang="en-US" dirty="0">
-                          <a:hlinkClick r:id="rId2"/>
+                          <a:hlinkClick r:id="rId5"/>
                         </a:rPr>
                         <a:t>https://shiny.rstudio.com/gallery/</a:t>
                       </a:r>
-                      <a:endParaRPr lang="en-US" dirty="0"/>
-                    </a:p>
-                    <a:p>
                       <a:endParaRPr lang="en-US" dirty="0"/>
                     </a:p>
                     <a:p>

</xml_diff>

<commit_message>
update ppt to add cloud run link
</commit_message>
<xml_diff>
--- a/Introduction to shiny.pptx
+++ b/Introduction to shiny.pptx
@@ -11977,7 +11977,7 @@
           <a:p>
             <a:fld id="{6AD6EE87-EBD5-4F12-A48A-63ACA297AC8F}" type="datetimeFigureOut">
               <a:rPr lang="en-US" dirty="0"/>
-              <a:t>2/24/2021</a:t>
+              <a:t>2/13/2022</a:t>
             </a:fld>
             <a:endParaRPr lang="en-US" dirty="0"/>
           </a:p>
@@ -12179,7 +12179,7 @@
           <a:p>
             <a:fld id="{4CD73815-2707-4475-8F1A-B873CB631BB4}" type="datetimeFigureOut">
               <a:rPr lang="en-US" dirty="0"/>
-              <a:t>2/24/2021</a:t>
+              <a:t>2/13/2022</a:t>
             </a:fld>
             <a:endParaRPr lang="en-US" dirty="0"/>
           </a:p>
@@ -12354,7 +12354,7 @@
           <a:p>
             <a:fld id="{2A4AFB99-0EAB-4182-AFF8-E214C82A68F6}" type="datetimeFigureOut">
               <a:rPr lang="en-US" dirty="0"/>
-              <a:t>2/24/2021</a:t>
+              <a:t>2/13/2022</a:t>
             </a:fld>
             <a:endParaRPr lang="en-US" dirty="0"/>
           </a:p>
@@ -12554,7 +12554,7 @@
           <a:p>
             <a:fld id="{A5D3794B-289A-4A80-97D7-111025398D45}" type="datetimeFigureOut">
               <a:rPr lang="en-US" dirty="0"/>
-              <a:t>2/24/2021</a:t>
+              <a:t>2/13/2022</a:t>
             </a:fld>
             <a:endParaRPr lang="en-US" dirty="0"/>
           </a:p>
@@ -21447,7 +21447,7 @@
           <a:p>
             <a:fld id="{5A61015F-7CC6-4D0A-9D87-873EA4C304CC}" type="datetimeFigureOut">
               <a:rPr lang="en-US" dirty="0"/>
-              <a:t>2/24/2021</a:t>
+              <a:t>2/13/2022</a:t>
             </a:fld>
             <a:endParaRPr lang="en-US" dirty="0"/>
           </a:p>
@@ -21716,7 +21716,7 @@
           <a:p>
             <a:fld id="{93C6A301-0538-44EC-B09D-202E1042A48B}" type="datetimeFigureOut">
               <a:rPr lang="en-US" dirty="0"/>
-              <a:t>2/24/2021</a:t>
+              <a:t>2/13/2022</a:t>
             </a:fld>
             <a:endParaRPr lang="en-US" dirty="0"/>
           </a:p>
@@ -22109,7 +22109,7 @@
           <a:p>
             <a:fld id="{D789574A-8875-45EF-8EA2-3CAA0F7ABC4C}" type="datetimeFigureOut">
               <a:rPr lang="en-US" dirty="0"/>
-              <a:t>2/24/2021</a:t>
+              <a:t>2/13/2022</a:t>
             </a:fld>
             <a:endParaRPr lang="en-US" dirty="0"/>
           </a:p>
@@ -22222,7 +22222,7 @@
           <a:p>
             <a:fld id="{67EF4D4C-5367-4C26-9E2B-D8088D7FCA81}" type="datetimeFigureOut">
               <a:rPr lang="en-US" dirty="0"/>
-              <a:t>2/24/2021</a:t>
+              <a:t>2/13/2022</a:t>
             </a:fld>
             <a:endParaRPr lang="en-US" dirty="0"/>
           </a:p>
@@ -22312,7 +22312,7 @@
           <a:p>
             <a:fld id="{56E91E96-98B0-4413-9547-46F3504108EF}" type="datetimeFigureOut">
               <a:rPr lang="en-US" dirty="0"/>
-              <a:t>2/24/2021</a:t>
+              <a:t>2/13/2022</a:t>
             </a:fld>
             <a:endParaRPr lang="en-US" dirty="0"/>
           </a:p>
@@ -22597,7 +22597,7 @@
           <a:p>
             <a:fld id="{05C68B11-C5A8-448C-8CE9-B1A273C79CFC}" type="datetimeFigureOut">
               <a:rPr lang="en-US" dirty="0"/>
-              <a:t>2/24/2021</a:t>
+              <a:t>2/13/2022</a:t>
             </a:fld>
             <a:endParaRPr lang="en-US" dirty="0"/>
           </a:p>
@@ -22872,7 +22872,7 @@
           <a:p>
             <a:fld id="{C7616CA0-919D-4A49-9C8A-62FDFB3A5183}" type="datetimeFigureOut">
               <a:rPr lang="en-US" dirty="0"/>
-              <a:t>2/24/2021</a:t>
+              <a:t>2/13/2022</a:t>
             </a:fld>
             <a:endParaRPr lang="en-US" dirty="0"/>
           </a:p>
@@ -23118,7 +23118,7 @@
             <a:fld id="{90298CD5-6C1E-4009-B41F-6DF62E31D3BE}" type="datetimeFigureOut">
               <a:rPr lang="en-US" dirty="0"/>
               <a:pPr/>
-              <a:t>2/24/2021</a:t>
+              <a:t>2/13/2022</a:t>
             </a:fld>
             <a:endParaRPr lang="en-US" dirty="0"/>
           </a:p>
@@ -23961,14 +23961,14 @@
           <p:nvPr>
             <p:extLst>
               <p:ext uri="{D42A27DB-BD31-4B8C-83A1-F6EECF244321}">
-                <p14:modId xmlns:p14="http://schemas.microsoft.com/office/powerpoint/2010/main" val="1526938971"/>
+                <p14:modId xmlns:p14="http://schemas.microsoft.com/office/powerpoint/2010/main" val="3284691251"/>
               </p:ext>
             </p:extLst>
           </p:nvPr>
         </p:nvGraphicFramePr>
         <p:xfrm>
-          <a:off x="1024128" y="1711071"/>
-          <a:ext cx="10454699" cy="5001158"/>
+          <a:off x="369116" y="1711071"/>
+          <a:ext cx="11518084" cy="5070715"/>
         </p:xfrm>
         <a:graphic>
           <a:graphicData uri="http://schemas.openxmlformats.org/drawingml/2006/table">
@@ -23977,21 +23977,21 @@
                 <a:tableStyleId>{5C22544A-7EE6-4342-B048-85BDC9FD1C3A}</a:tableStyleId>
               </a:tblPr>
               <a:tblGrid>
-                <a:gridCol w="2544695">
+                <a:gridCol w="2803525">
                   <a:extLst>
                     <a:ext uri="{9D8B030D-6E8A-4147-A177-3AD203B41FA5}">
                       <a16:colId xmlns:a16="http://schemas.microsoft.com/office/drawing/2014/main" val="1722150710"/>
                     </a:ext>
                   </a:extLst>
                 </a:gridCol>
-                <a:gridCol w="4953740">
+                <a:gridCol w="5457603">
                   <a:extLst>
                     <a:ext uri="{9D8B030D-6E8A-4147-A177-3AD203B41FA5}">
                       <a16:colId xmlns:a16="http://schemas.microsoft.com/office/drawing/2014/main" val="2569811400"/>
                     </a:ext>
                   </a:extLst>
                 </a:gridCol>
-                <a:gridCol w="2956264">
+                <a:gridCol w="3256956">
                   <a:extLst>
                     <a:ext uri="{9D8B030D-6E8A-4147-A177-3AD203B41FA5}">
                       <a16:colId xmlns:a16="http://schemas.microsoft.com/office/drawing/2014/main" val="2128555796"/>
@@ -23999,7 +23999,7 @@
                   </a:extLst>
                 </a:gridCol>
               </a:tblGrid>
-              <a:tr h="347626">
+              <a:tr h="306065">
                 <a:tc>
                   <a:txBody>
                     <a:bodyPr/>
@@ -24045,7 +24045,7 @@
                   </a:ext>
                 </a:extLst>
               </a:tr>
-              <a:tr h="2172662">
+              <a:tr h="1912904">
                 <a:tc>
                   <a:txBody>
                     <a:bodyPr/>
@@ -24130,7 +24130,7 @@
                   </a:ext>
                 </a:extLst>
               </a:tr>
-              <a:tr h="1159080">
+              <a:tr h="994710">
                 <a:tc>
                   <a:txBody>
                     <a:bodyPr/>
@@ -24182,7 +24182,7 @@
                   </a:ext>
                 </a:extLst>
               </a:tr>
-              <a:tr h="1160678">
+              <a:tr h="784165">
                 <a:tc>
                   <a:txBody>
                     <a:bodyPr/>
@@ -24234,6 +24234,60 @@
                 <a:extLst>
                   <a:ext uri="{0D108BD9-81ED-4DB2-BD59-A6C34878D82A}">
                     <a16:rowId xmlns:a16="http://schemas.microsoft.com/office/drawing/2014/main" val="3091215845"/>
+                  </a:ext>
+                </a:extLst>
+              </a:tr>
+              <a:tr h="784165">
+                <a:tc>
+                  <a:txBody>
+                    <a:bodyPr/>
+                    <a:lstStyle/>
+                    <a:p>
+                      <a:r>
+                        <a:rPr lang="en-US" dirty="0"/>
+                        <a:t>Shiny app on Google Cloud Run</a:t>
+                      </a:r>
+                    </a:p>
+                  </a:txBody>
+                  <a:tcPr/>
+                </a:tc>
+                <a:tc>
+                  <a:txBody>
+                    <a:bodyPr/>
+                    <a:lstStyle/>
+                    <a:p>
+                      <a:r>
+                        <a:rPr lang="en-US" dirty="0"/>
+                        <a:t>https://code.markedmondson.me/shiny-cloudrun/</a:t>
+                      </a:r>
+                    </a:p>
+                  </a:txBody>
+                  <a:tcPr/>
+                </a:tc>
+                <a:tc>
+                  <a:txBody>
+                    <a:bodyPr/>
+                    <a:lstStyle/>
+                    <a:p>
+                      <a:r>
+                        <a:rPr lang="en-US" dirty="0"/>
+                        <a:t>Cloud hosted Shiny App without </a:t>
+                      </a:r>
+                      <a:r>
+                        <a:rPr lang="en-US" dirty="0" err="1"/>
+                        <a:t>Rstudio</a:t>
+                      </a:r>
+                      <a:r>
+                        <a:rPr lang="en-US" dirty="0"/>
+                        <a:t> Connect</a:t>
+                      </a:r>
+                    </a:p>
+                  </a:txBody>
+                  <a:tcPr/>
+                </a:tc>
+                <a:extLst>
+                  <a:ext uri="{0D108BD9-81ED-4DB2-BD59-A6C34878D82A}">
+                    <a16:rowId xmlns:a16="http://schemas.microsoft.com/office/drawing/2014/main" val="4115257588"/>
                   </a:ext>
                 </a:extLst>
               </a:tr>

</xml_diff>